<commit_message>
added new milestone video
</commit_message>
<xml_diff>
--- a/bdpt_and_mis_with_ppm.pptx
+++ b/bdpt_and_mis_with_ppm.pptx
@@ -291,7 +291,7 @@
           <a:p>
             <a:fld id="{68162C04-BCE9-F943-9CB0-70397EC5A22E}" type="datetimeFigureOut">
               <a:rPr lang="en-US" smtClean="0"/>
-              <a:t>4/23/17</a:t>
+              <a:t>4/24/17</a:t>
             </a:fld>
             <a:endParaRPr lang="en-US"/>
           </a:p>
@@ -461,7 +461,7 @@
           <a:p>
             <a:fld id="{68162C04-BCE9-F943-9CB0-70397EC5A22E}" type="datetimeFigureOut">
               <a:rPr lang="en-US" smtClean="0"/>
-              <a:t>4/23/17</a:t>
+              <a:t>4/24/17</a:t>
             </a:fld>
             <a:endParaRPr lang="en-US"/>
           </a:p>
@@ -641,7 +641,7 @@
           <a:p>
             <a:fld id="{68162C04-BCE9-F943-9CB0-70397EC5A22E}" type="datetimeFigureOut">
               <a:rPr lang="en-US" smtClean="0"/>
-              <a:t>4/23/17</a:t>
+              <a:t>4/24/17</a:t>
             </a:fld>
             <a:endParaRPr lang="en-US"/>
           </a:p>
@@ -811,7 +811,7 @@
           <a:p>
             <a:fld id="{68162C04-BCE9-F943-9CB0-70397EC5A22E}" type="datetimeFigureOut">
               <a:rPr lang="en-US" smtClean="0"/>
-              <a:t>4/23/17</a:t>
+              <a:t>4/24/17</a:t>
             </a:fld>
             <a:endParaRPr lang="en-US"/>
           </a:p>
@@ -1057,7 +1057,7 @@
           <a:p>
             <a:fld id="{68162C04-BCE9-F943-9CB0-70397EC5A22E}" type="datetimeFigureOut">
               <a:rPr lang="en-US" smtClean="0"/>
-              <a:t>4/23/17</a:t>
+              <a:t>4/24/17</a:t>
             </a:fld>
             <a:endParaRPr lang="en-US"/>
           </a:p>
@@ -1345,7 +1345,7 @@
           <a:p>
             <a:fld id="{68162C04-BCE9-F943-9CB0-70397EC5A22E}" type="datetimeFigureOut">
               <a:rPr lang="en-US" smtClean="0"/>
-              <a:t>4/23/17</a:t>
+              <a:t>4/24/17</a:t>
             </a:fld>
             <a:endParaRPr lang="en-US"/>
           </a:p>
@@ -1767,7 +1767,7 @@
           <a:p>
             <a:fld id="{68162C04-BCE9-F943-9CB0-70397EC5A22E}" type="datetimeFigureOut">
               <a:rPr lang="en-US" smtClean="0"/>
-              <a:t>4/23/17</a:t>
+              <a:t>4/24/17</a:t>
             </a:fld>
             <a:endParaRPr lang="en-US"/>
           </a:p>
@@ -1885,7 +1885,7 @@
           <a:p>
             <a:fld id="{68162C04-BCE9-F943-9CB0-70397EC5A22E}" type="datetimeFigureOut">
               <a:rPr lang="en-US" smtClean="0"/>
-              <a:t>4/23/17</a:t>
+              <a:t>4/24/17</a:t>
             </a:fld>
             <a:endParaRPr lang="en-US"/>
           </a:p>
@@ -1980,7 +1980,7 @@
           <a:p>
             <a:fld id="{68162C04-BCE9-F943-9CB0-70397EC5A22E}" type="datetimeFigureOut">
               <a:rPr lang="en-US" smtClean="0"/>
-              <a:t>4/23/17</a:t>
+              <a:t>4/24/17</a:t>
             </a:fld>
             <a:endParaRPr lang="en-US"/>
           </a:p>
@@ -2257,7 +2257,7 @@
           <a:p>
             <a:fld id="{68162C04-BCE9-F943-9CB0-70397EC5A22E}" type="datetimeFigureOut">
               <a:rPr lang="en-US" smtClean="0"/>
-              <a:t>4/23/17</a:t>
+              <a:t>4/24/17</a:t>
             </a:fld>
             <a:endParaRPr lang="en-US"/>
           </a:p>
@@ -2510,7 +2510,7 @@
           <a:p>
             <a:fld id="{68162C04-BCE9-F943-9CB0-70397EC5A22E}" type="datetimeFigureOut">
               <a:rPr lang="en-US" smtClean="0"/>
-              <a:t>4/23/17</a:t>
+              <a:t>4/24/17</a:t>
             </a:fld>
             <a:endParaRPr lang="en-US"/>
           </a:p>
@@ -2723,7 +2723,7 @@
           <a:p>
             <a:fld id="{68162C04-BCE9-F943-9CB0-70397EC5A22E}" type="datetimeFigureOut">
               <a:rPr lang="en-US" smtClean="0"/>
-              <a:t>4/23/17</a:t>
+              <a:t>4/24/17</a:t>
             </a:fld>
             <a:endParaRPr lang="en-US"/>
           </a:p>
@@ -3260,18 +3260,12 @@
             <a:pPr lvl="1"/>
             <a:r>
               <a:rPr lang="en-US" dirty="0" smtClean="0"/>
-              <a:t>Photon mapping</a:t>
-            </a:r>
-          </a:p>
-          <a:p>
-            <a:pPr lvl="1"/>
+              <a:t>Photon </a:t>
+            </a:r>
             <a:r>
               <a:rPr lang="en-US" dirty="0" smtClean="0"/>
-              <a:t>Environment lighting</a:t>
-            </a:r>
-          </a:p>
-          <a:p>
-            <a:pPr lvl="1"/>
+              <a:t>mapping</a:t>
+            </a:r>
             <a:endParaRPr lang="en-US" dirty="0" smtClean="0"/>
           </a:p>
         </p:txBody>
@@ -3316,69 +3310,684 @@
             <p:ph type="title"/>
           </p:nvPr>
         </p:nvSpPr>
-        <p:spPr/>
-        <p:txBody>
-          <a:bodyPr/>
-          <a:lstStyle/>
-          <a:p>
-            <a:r>
-              <a:rPr lang="en-US" dirty="0" smtClean="0"/>
+        <p:spPr>
+          <a:xfrm>
+            <a:off x="5678487" y="273050"/>
+            <a:ext cx="3008313" cy="1162050"/>
+          </a:xfrm>
+        </p:spPr>
+        <p:txBody>
+          <a:bodyPr>
+            <a:normAutofit/>
+          </a:bodyPr>
+          <a:lstStyle/>
+          <a:p>
+            <a:r>
+              <a:rPr lang="en-US" sz="3200" dirty="0" smtClean="0"/>
               <a:t>Bidirectional Path Tracing</a:t>
             </a:r>
+            <a:endParaRPr lang="en-US" sz="3200" dirty="0"/>
+          </a:p>
+        </p:txBody>
+      </p:sp>
+      <p:sp>
+        <p:nvSpPr>
+          <p:cNvPr id="3" name="Content Placeholder 2"/>
+          <p:cNvSpPr>
+            <a:spLocks noGrp="1"/>
+          </p:cNvSpPr>
+          <p:nvPr>
+            <p:ph idx="1"/>
+          </p:nvPr>
+        </p:nvSpPr>
+        <p:spPr>
+          <a:xfrm>
+            <a:off x="345560" y="273050"/>
+            <a:ext cx="5111750" cy="5853113"/>
+          </a:xfrm>
+        </p:spPr>
+        <p:txBody>
+          <a:bodyPr>
+            <a:normAutofit/>
+          </a:bodyPr>
+          <a:lstStyle/>
+          <a:p>
+            <a:pPr marL="0" indent="0">
+              <a:buNone/>
+            </a:pPr>
+            <a:endParaRPr lang="en-US" sz="2400" dirty="0" smtClean="0"/>
+          </a:p>
+        </p:txBody>
+      </p:sp>
+      <p:sp>
+        <p:nvSpPr>
+          <p:cNvPr id="4" name="Text Placeholder 3"/>
+          <p:cNvSpPr>
+            <a:spLocks noGrp="1"/>
+          </p:cNvSpPr>
+          <p:nvPr>
+            <p:ph type="body" sz="half" idx="2"/>
+          </p:nvPr>
+        </p:nvSpPr>
+        <p:spPr>
+          <a:xfrm>
+            <a:off x="5678487" y="1404741"/>
+            <a:ext cx="3008313" cy="4691063"/>
+          </a:xfrm>
+        </p:spPr>
+        <p:txBody>
+          <a:bodyPr>
+            <a:normAutofit fontScale="92500" lnSpcReduction="10000"/>
+          </a:bodyPr>
+          <a:lstStyle/>
+          <a:p>
+            <a:pPr marL="342900" indent="-342900">
+              <a:buFont typeface="Arial"/>
+              <a:buChar char="•"/>
+            </a:pPr>
+            <a:r>
+              <a:rPr lang="en-US" sz="2200" dirty="0"/>
+              <a:t>Light rays originate from light sources and accumulate on a surface in the </a:t>
+            </a:r>
+            <a:r>
+              <a:rPr lang="en-US" sz="2200" dirty="0" smtClean="0"/>
+              <a:t>scene.</a:t>
+            </a:r>
+          </a:p>
+          <a:p>
+            <a:pPr marL="800100" lvl="1" indent="-342900">
+              <a:buFont typeface="Arial"/>
+              <a:buChar char="•"/>
+            </a:pPr>
+            <a:r>
+              <a:rPr lang="en-US" sz="1800" dirty="0" smtClean="0"/>
+              <a:t>Work </a:t>
+            </a:r>
+            <a:r>
+              <a:rPr lang="en-US" sz="1800" dirty="0"/>
+              <a:t>well for directional </a:t>
+            </a:r>
+            <a:r>
+              <a:rPr lang="en-US" sz="1800" dirty="0" smtClean="0"/>
+              <a:t>lights.</a:t>
+            </a:r>
+          </a:p>
+          <a:p>
+            <a:pPr marL="342900" indent="-342900">
+              <a:buFont typeface="Arial"/>
+              <a:buChar char="•"/>
+            </a:pPr>
+            <a:r>
+              <a:rPr lang="en-US" sz="2200" dirty="0" smtClean="0"/>
+              <a:t>Samples </a:t>
+            </a:r>
+            <a:r>
+              <a:rPr lang="en-US" sz="2200" dirty="0"/>
+              <a:t>are fired out of the camera into the scene and bounce until they hit a light </a:t>
+            </a:r>
+            <a:r>
+              <a:rPr lang="en-US" sz="2200" dirty="0" smtClean="0"/>
+              <a:t>source.</a:t>
+            </a:r>
+          </a:p>
+          <a:p>
+            <a:pPr marL="800100" lvl="1" indent="-342900">
+              <a:buFont typeface="Arial"/>
+              <a:buChar char="•"/>
+            </a:pPr>
+            <a:r>
+              <a:rPr lang="en-US" sz="1800" dirty="0" smtClean="0"/>
+              <a:t>Good </a:t>
+            </a:r>
+            <a:r>
+              <a:rPr lang="en-US" sz="1800" dirty="0"/>
+              <a:t>for specular </a:t>
+            </a:r>
+            <a:r>
+              <a:rPr lang="en-US" sz="1800" dirty="0" smtClean="0"/>
+              <a:t>reflection</a:t>
+            </a:r>
+          </a:p>
+          <a:p>
+            <a:pPr marL="342900" indent="-342900">
+              <a:buFont typeface="Arial"/>
+              <a:buChar char="•"/>
+            </a:pPr>
+            <a:r>
+              <a:rPr lang="en-US" sz="2200" dirty="0" smtClean="0"/>
+              <a:t>Join </a:t>
+            </a:r>
+            <a:r>
+              <a:rPr lang="en-US" sz="2200" dirty="0"/>
+              <a:t>light rays and samples at vertices to form complete paths</a:t>
+            </a:r>
+            <a:r>
+              <a:rPr lang="en-US" sz="2600" dirty="0"/>
+              <a:t>.</a:t>
+            </a:r>
+          </a:p>
+          <a:p>
             <a:endParaRPr lang="en-US" dirty="0"/>
           </a:p>
         </p:txBody>
       </p:sp>
-      <p:sp>
-        <p:nvSpPr>
-          <p:cNvPr id="3" name="Content Placeholder 2"/>
-          <p:cNvSpPr>
-            <a:spLocks noGrp="1"/>
-          </p:cNvSpPr>
-          <p:nvPr>
-            <p:ph idx="1"/>
-          </p:nvPr>
-        </p:nvSpPr>
-        <p:spPr/>
-        <p:txBody>
-          <a:bodyPr>
-            <a:normAutofit fontScale="92500"/>
-          </a:bodyPr>
-          <a:lstStyle/>
-          <a:p>
-            <a:r>
-              <a:rPr lang="en-US" dirty="0" smtClean="0"/>
-              <a:t>Light rays originate from light sources and accumulate on a surface in the scene.</a:t>
-            </a:r>
-          </a:p>
-          <a:p>
-            <a:pPr lvl="1"/>
-            <a:r>
-              <a:rPr lang="en-US" dirty="0" smtClean="0"/>
-              <a:t>Work well for directional lights.</a:t>
-            </a:r>
-          </a:p>
-          <a:p>
-            <a:r>
-              <a:rPr lang="en-US" dirty="0" smtClean="0"/>
-              <a:t>Samples are fired out of the camera into the scene and bounce until they hit a light source.</a:t>
-            </a:r>
-          </a:p>
-          <a:p>
-            <a:pPr lvl="1"/>
-            <a:r>
-              <a:rPr lang="en-US" dirty="0" smtClean="0"/>
-              <a:t>Good for specular reflection</a:t>
-            </a:r>
-          </a:p>
-          <a:p>
-            <a:r>
-              <a:rPr lang="en-US" dirty="0" smtClean="0"/>
-              <a:t>Join a light ray and a sample ray at some point in the scene along their path to take use their respective advantages to speed up convergence.</a:t>
-            </a:r>
-          </a:p>
-        </p:txBody>
-      </p:sp>
+      <p:cxnSp>
+        <p:nvCxnSpPr>
+          <p:cNvPr id="6" name="Straight Connector 5"/>
+          <p:cNvCxnSpPr/>
+          <p:nvPr/>
+        </p:nvCxnSpPr>
+        <p:spPr>
+          <a:xfrm flipV="1">
+            <a:off x="4270224" y="1577113"/>
+            <a:ext cx="460514" cy="223308"/>
+          </a:xfrm>
+          <a:prstGeom prst="line">
+            <a:avLst/>
+          </a:prstGeom>
+        </p:spPr>
+        <p:style>
+          <a:lnRef idx="2">
+            <a:schemeClr val="accent1"/>
+          </a:lnRef>
+          <a:fillRef idx="0">
+            <a:schemeClr val="accent1"/>
+          </a:fillRef>
+          <a:effectRef idx="1">
+            <a:schemeClr val="accent1"/>
+          </a:effectRef>
+          <a:fontRef idx="minor">
+            <a:schemeClr val="tx1"/>
+          </a:fontRef>
+        </p:style>
+      </p:cxnSp>
+      <p:cxnSp>
+        <p:nvCxnSpPr>
+          <p:cNvPr id="9" name="Straight Connector 8"/>
+          <p:cNvCxnSpPr/>
+          <p:nvPr/>
+        </p:nvCxnSpPr>
+        <p:spPr>
+          <a:xfrm>
+            <a:off x="4730738" y="1577113"/>
+            <a:ext cx="0" cy="446616"/>
+          </a:xfrm>
+          <a:prstGeom prst="line">
+            <a:avLst/>
+          </a:prstGeom>
+        </p:spPr>
+        <p:style>
+          <a:lnRef idx="2">
+            <a:schemeClr val="accent1"/>
+          </a:lnRef>
+          <a:fillRef idx="0">
+            <a:schemeClr val="accent1"/>
+          </a:fillRef>
+          <a:effectRef idx="1">
+            <a:schemeClr val="accent1"/>
+          </a:effectRef>
+          <a:fontRef idx="minor">
+            <a:schemeClr val="tx1"/>
+          </a:fontRef>
+        </p:style>
+      </p:cxnSp>
+      <p:sp>
+        <p:nvSpPr>
+          <p:cNvPr id="10" name="Arc 9"/>
+          <p:cNvSpPr/>
+          <p:nvPr/>
+        </p:nvSpPr>
+        <p:spPr>
+          <a:xfrm rot="9707862">
+            <a:off x="4276240" y="974163"/>
+            <a:ext cx="935015" cy="935015"/>
+          </a:xfrm>
+          <a:prstGeom prst="arc">
+            <a:avLst/>
+          </a:prstGeom>
+        </p:spPr>
+        <p:style>
+          <a:lnRef idx="2">
+            <a:schemeClr val="accent1"/>
+          </a:lnRef>
+          <a:fillRef idx="0">
+            <a:schemeClr val="accent1"/>
+          </a:fillRef>
+          <a:effectRef idx="1">
+            <a:schemeClr val="accent1"/>
+          </a:effectRef>
+          <a:fontRef idx="minor">
+            <a:schemeClr val="tx1"/>
+          </a:fontRef>
+        </p:style>
+        <p:txBody>
+          <a:bodyPr rtlCol="0" anchor="ctr"/>
+          <a:lstStyle/>
+          <a:p>
+            <a:pPr algn="ctr"/>
+            <a:endParaRPr lang="en-US"/>
+          </a:p>
+        </p:txBody>
+      </p:sp>
+      <p:sp>
+        <p:nvSpPr>
+          <p:cNvPr id="11" name="Arc 10"/>
+          <p:cNvSpPr/>
+          <p:nvPr/>
+        </p:nvSpPr>
+        <p:spPr>
+          <a:xfrm rot="21154379">
+            <a:off x="4249291" y="1772507"/>
+            <a:ext cx="404694" cy="362876"/>
+          </a:xfrm>
+          <a:prstGeom prst="arc">
+            <a:avLst/>
+          </a:prstGeom>
+        </p:spPr>
+        <p:style>
+          <a:lnRef idx="2">
+            <a:schemeClr val="accent1"/>
+          </a:lnRef>
+          <a:fillRef idx="0">
+            <a:schemeClr val="accent1"/>
+          </a:fillRef>
+          <a:effectRef idx="1">
+            <a:schemeClr val="accent1"/>
+          </a:effectRef>
+          <a:fontRef idx="minor">
+            <a:schemeClr val="tx1"/>
+          </a:fontRef>
+        </p:style>
+        <p:txBody>
+          <a:bodyPr rtlCol="0" anchor="ctr"/>
+          <a:lstStyle/>
+          <a:p>
+            <a:pPr algn="ctr"/>
+            <a:endParaRPr lang="en-US"/>
+          </a:p>
+        </p:txBody>
+      </p:sp>
+      <p:sp>
+        <p:nvSpPr>
+          <p:cNvPr id="12" name="Rectangle 11"/>
+          <p:cNvSpPr/>
+          <p:nvPr/>
+        </p:nvSpPr>
+        <p:spPr>
+          <a:xfrm>
+            <a:off x="2149067" y="4535945"/>
+            <a:ext cx="139550" cy="963016"/>
+          </a:xfrm>
+          <a:prstGeom prst="rect">
+            <a:avLst/>
+          </a:prstGeom>
+        </p:spPr>
+        <p:style>
+          <a:lnRef idx="1">
+            <a:schemeClr val="accent1"/>
+          </a:lnRef>
+          <a:fillRef idx="3">
+            <a:schemeClr val="accent1"/>
+          </a:fillRef>
+          <a:effectRef idx="2">
+            <a:schemeClr val="accent1"/>
+          </a:effectRef>
+          <a:fontRef idx="minor">
+            <a:schemeClr val="lt1"/>
+          </a:fontRef>
+        </p:style>
+        <p:txBody>
+          <a:bodyPr rtlCol="0" anchor="ctr"/>
+          <a:lstStyle/>
+          <a:p>
+            <a:pPr algn="ctr"/>
+            <a:endParaRPr lang="en-US"/>
+          </a:p>
+        </p:txBody>
+      </p:sp>
+      <p:sp>
+        <p:nvSpPr>
+          <p:cNvPr id="16" name="Rectangle 15"/>
+          <p:cNvSpPr/>
+          <p:nvPr/>
+        </p:nvSpPr>
+        <p:spPr>
+          <a:xfrm>
+            <a:off x="3752785" y="4535945"/>
+            <a:ext cx="139550" cy="963016"/>
+          </a:xfrm>
+          <a:prstGeom prst="rect">
+            <a:avLst/>
+          </a:prstGeom>
+        </p:spPr>
+        <p:style>
+          <a:lnRef idx="1">
+            <a:schemeClr val="accent1"/>
+          </a:lnRef>
+          <a:fillRef idx="3">
+            <a:schemeClr val="accent1"/>
+          </a:fillRef>
+          <a:effectRef idx="2">
+            <a:schemeClr val="accent1"/>
+          </a:effectRef>
+          <a:fontRef idx="minor">
+            <a:schemeClr val="lt1"/>
+          </a:fontRef>
+        </p:style>
+        <p:txBody>
+          <a:bodyPr rtlCol="0" anchor="ctr"/>
+          <a:lstStyle/>
+          <a:p>
+            <a:pPr algn="ctr"/>
+            <a:endParaRPr lang="en-US"/>
+          </a:p>
+        </p:txBody>
+      </p:sp>
+      <p:sp>
+        <p:nvSpPr>
+          <p:cNvPr id="17" name="Rectangle 16"/>
+          <p:cNvSpPr/>
+          <p:nvPr/>
+        </p:nvSpPr>
+        <p:spPr>
+          <a:xfrm>
+            <a:off x="1758327" y="4382421"/>
+            <a:ext cx="2511897" cy="153524"/>
+          </a:xfrm>
+          <a:prstGeom prst="rect">
+            <a:avLst/>
+          </a:prstGeom>
+        </p:spPr>
+        <p:style>
+          <a:lnRef idx="1">
+            <a:schemeClr val="accent1"/>
+          </a:lnRef>
+          <a:fillRef idx="3">
+            <a:schemeClr val="accent1"/>
+          </a:fillRef>
+          <a:effectRef idx="2">
+            <a:schemeClr val="accent1"/>
+          </a:effectRef>
+          <a:fontRef idx="minor">
+            <a:schemeClr val="lt1"/>
+          </a:fontRef>
+        </p:style>
+        <p:txBody>
+          <a:bodyPr rtlCol="0" anchor="ctr"/>
+          <a:lstStyle/>
+          <a:p>
+            <a:pPr algn="ctr"/>
+            <a:endParaRPr lang="en-US"/>
+          </a:p>
+        </p:txBody>
+      </p:sp>
+      <p:sp>
+        <p:nvSpPr>
+          <p:cNvPr id="18" name="Sun 17"/>
+          <p:cNvSpPr/>
+          <p:nvPr/>
+        </p:nvSpPr>
+        <p:spPr>
+          <a:xfrm>
+            <a:off x="879164" y="1284021"/>
+            <a:ext cx="655884" cy="628054"/>
+          </a:xfrm>
+          <a:prstGeom prst="sun">
+            <a:avLst/>
+          </a:prstGeom>
+          <a:solidFill>
+            <a:schemeClr val="accent2"/>
+          </a:solidFill>
+          <a:ln>
+            <a:solidFill>
+              <a:schemeClr val="accent2"/>
+            </a:solidFill>
+          </a:ln>
+        </p:spPr>
+        <p:style>
+          <a:lnRef idx="1">
+            <a:schemeClr val="accent1"/>
+          </a:lnRef>
+          <a:fillRef idx="3">
+            <a:schemeClr val="accent1"/>
+          </a:fillRef>
+          <a:effectRef idx="2">
+            <a:schemeClr val="accent1"/>
+          </a:effectRef>
+          <a:fontRef idx="minor">
+            <a:schemeClr val="lt1"/>
+          </a:fontRef>
+        </p:style>
+        <p:txBody>
+          <a:bodyPr rtlCol="0" anchor="ctr"/>
+          <a:lstStyle/>
+          <a:p>
+            <a:pPr algn="ctr"/>
+            <a:endParaRPr lang="en-US"/>
+          </a:p>
+        </p:txBody>
+      </p:sp>
+      <p:cxnSp>
+        <p:nvCxnSpPr>
+          <p:cNvPr id="21" name="Straight Arrow Connector 20"/>
+          <p:cNvCxnSpPr/>
+          <p:nvPr/>
+        </p:nvCxnSpPr>
+        <p:spPr>
+          <a:xfrm>
+            <a:off x="1353633" y="1912075"/>
+            <a:ext cx="934984" cy="2470346"/>
+          </a:xfrm>
+          <a:prstGeom prst="straightConnector1">
+            <a:avLst/>
+          </a:prstGeom>
+          <a:ln>
+            <a:solidFill>
+              <a:srgbClr val="C0504D"/>
+            </a:solidFill>
+            <a:tailEnd type="arrow"/>
+          </a:ln>
+        </p:spPr>
+        <p:style>
+          <a:lnRef idx="2">
+            <a:schemeClr val="accent1"/>
+          </a:lnRef>
+          <a:fillRef idx="0">
+            <a:schemeClr val="accent1"/>
+          </a:fillRef>
+          <a:effectRef idx="1">
+            <a:schemeClr val="accent1"/>
+          </a:effectRef>
+          <a:fontRef idx="minor">
+            <a:schemeClr val="tx1"/>
+          </a:fontRef>
+        </p:style>
+      </p:cxnSp>
+      <p:cxnSp>
+        <p:nvCxnSpPr>
+          <p:cNvPr id="23" name="Straight Arrow Connector 22"/>
+          <p:cNvCxnSpPr/>
+          <p:nvPr/>
+        </p:nvCxnSpPr>
+        <p:spPr>
+          <a:xfrm flipH="1">
+            <a:off x="3251510" y="1912075"/>
+            <a:ext cx="1255948" cy="2470346"/>
+          </a:xfrm>
+          <a:prstGeom prst="straightConnector1">
+            <a:avLst/>
+          </a:prstGeom>
+          <a:ln>
+            <a:tailEnd type="arrow"/>
+          </a:ln>
+        </p:spPr>
+        <p:style>
+          <a:lnRef idx="2">
+            <a:schemeClr val="accent1"/>
+          </a:lnRef>
+          <a:fillRef idx="0">
+            <a:schemeClr val="accent1"/>
+          </a:fillRef>
+          <a:effectRef idx="1">
+            <a:schemeClr val="accent1"/>
+          </a:effectRef>
+          <a:fontRef idx="minor">
+            <a:schemeClr val="tx1"/>
+          </a:fontRef>
+        </p:style>
+      </p:cxnSp>
+      <p:cxnSp>
+        <p:nvCxnSpPr>
+          <p:cNvPr id="25" name="Straight Arrow Connector 24"/>
+          <p:cNvCxnSpPr/>
+          <p:nvPr/>
+        </p:nvCxnSpPr>
+        <p:spPr>
+          <a:xfrm flipH="1" flipV="1">
+            <a:off x="1353633" y="1912075"/>
+            <a:ext cx="1897877" cy="2470346"/>
+          </a:xfrm>
+          <a:prstGeom prst="straightConnector1">
+            <a:avLst/>
+          </a:prstGeom>
+          <a:ln>
+            <a:tailEnd type="arrow"/>
+          </a:ln>
+        </p:spPr>
+        <p:style>
+          <a:lnRef idx="2">
+            <a:schemeClr val="accent1"/>
+          </a:lnRef>
+          <a:fillRef idx="0">
+            <a:schemeClr val="accent1"/>
+          </a:fillRef>
+          <a:effectRef idx="1">
+            <a:schemeClr val="accent1"/>
+          </a:effectRef>
+          <a:fontRef idx="minor">
+            <a:schemeClr val="tx1"/>
+          </a:fontRef>
+        </p:style>
+      </p:cxnSp>
+      <p:sp>
+        <p:nvSpPr>
+          <p:cNvPr id="27" name="Sun 26"/>
+          <p:cNvSpPr/>
+          <p:nvPr/>
+        </p:nvSpPr>
+        <p:spPr>
+          <a:xfrm>
+            <a:off x="2288617" y="1032800"/>
+            <a:ext cx="530289" cy="544313"/>
+          </a:xfrm>
+          <a:prstGeom prst="sun">
+            <a:avLst/>
+          </a:prstGeom>
+          <a:solidFill>
+            <a:srgbClr val="FFFF00"/>
+          </a:solidFill>
+          <a:ln>
+            <a:solidFill>
+              <a:srgbClr val="FFFF00"/>
+            </a:solidFill>
+          </a:ln>
+        </p:spPr>
+        <p:style>
+          <a:lnRef idx="1">
+            <a:schemeClr val="accent1"/>
+          </a:lnRef>
+          <a:fillRef idx="3">
+            <a:schemeClr val="accent1"/>
+          </a:fillRef>
+          <a:effectRef idx="2">
+            <a:schemeClr val="accent1"/>
+          </a:effectRef>
+          <a:fontRef idx="minor">
+            <a:schemeClr val="lt1"/>
+          </a:fontRef>
+        </p:style>
+        <p:txBody>
+          <a:bodyPr rtlCol="0" anchor="ctr"/>
+          <a:lstStyle/>
+          <a:p>
+            <a:pPr algn="ctr"/>
+            <a:endParaRPr lang="en-US"/>
+          </a:p>
+        </p:txBody>
+      </p:sp>
+      <p:cxnSp>
+        <p:nvCxnSpPr>
+          <p:cNvPr id="29" name="Straight Arrow Connector 28"/>
+          <p:cNvCxnSpPr>
+            <a:stCxn id="27" idx="2"/>
+          </p:cNvCxnSpPr>
+          <p:nvPr/>
+        </p:nvCxnSpPr>
+        <p:spPr>
+          <a:xfrm flipH="1">
+            <a:off x="2288617" y="1577113"/>
+            <a:ext cx="265145" cy="2805308"/>
+          </a:xfrm>
+          <a:prstGeom prst="straightConnector1">
+            <a:avLst/>
+          </a:prstGeom>
+          <a:ln>
+            <a:solidFill>
+              <a:srgbClr val="FFFF00"/>
+            </a:solidFill>
+            <a:tailEnd type="arrow"/>
+          </a:ln>
+        </p:spPr>
+        <p:style>
+          <a:lnRef idx="2">
+            <a:schemeClr val="accent1"/>
+          </a:lnRef>
+          <a:fillRef idx="0">
+            <a:schemeClr val="accent1"/>
+          </a:fillRef>
+          <a:effectRef idx="1">
+            <a:schemeClr val="accent1"/>
+          </a:effectRef>
+          <a:fontRef idx="minor">
+            <a:schemeClr val="tx1"/>
+          </a:fontRef>
+        </p:style>
+      </p:cxnSp>
+      <p:cxnSp>
+        <p:nvCxnSpPr>
+          <p:cNvPr id="31" name="Straight Arrow Connector 30"/>
+          <p:cNvCxnSpPr>
+            <a:endCxn id="27" idx="2"/>
+          </p:cNvCxnSpPr>
+          <p:nvPr/>
+        </p:nvCxnSpPr>
+        <p:spPr>
+          <a:xfrm flipH="1" flipV="1">
+            <a:off x="2553762" y="1577113"/>
+            <a:ext cx="697748" cy="2805308"/>
+          </a:xfrm>
+          <a:prstGeom prst="straightConnector1">
+            <a:avLst/>
+          </a:prstGeom>
+          <a:ln>
+            <a:tailEnd type="arrow"/>
+          </a:ln>
+        </p:spPr>
+        <p:style>
+          <a:lnRef idx="2">
+            <a:schemeClr val="accent1"/>
+          </a:lnRef>
+          <a:fillRef idx="0">
+            <a:schemeClr val="accent1"/>
+          </a:fillRef>
+          <a:effectRef idx="1">
+            <a:schemeClr val="accent1"/>
+          </a:effectRef>
+          <a:fontRef idx="minor">
+            <a:schemeClr val="tx1"/>
+          </a:fontRef>
+        </p:style>
+      </p:cxnSp>
     </p:spTree>
     <p:extLst>
       <p:ext uri="{BB962C8B-B14F-4D97-AF65-F5344CB8AC3E}">

</xml_diff>